<commit_message>
- Se carga servicio de autorizacion que permite generar el token con OAuth2 - Se agrega archivos complemetarios de mvn que qudaron pendientes por subir
</commit_message>
<xml_diff>
--- a/Arquitectura.pptx
+++ b/Arquitectura.pptx
@@ -104,6 +104,11 @@
       </a:defRPr>
     </a:lvl9pPr>
   </p:defaultTextStyle>
+  <p:extLst>
+    <p:ext uri="{EFAFB233-063F-42B5-8137-9DF3F51BA10A}">
+      <p15:sldGuideLst xmlns:p15="http://schemas.microsoft.com/office/powerpoint/2012/main"/>
+    </p:ext>
+  </p:extLst>
 </p:presentation>
 </file>
 
@@ -256,7 +261,7 @@
           <a:p>
             <a:fld id="{C953AA9C-1434-4059-A8DA-326E09552A92}" type="datetimeFigureOut">
               <a:rPr lang="es-CO" smtClean="0"/>
-              <a:t>2/01/2021</a:t>
+              <a:t>18/04/2021</a:t>
             </a:fld>
             <a:endParaRPr lang="es-CO"/>
           </a:p>
@@ -456,7 +461,7 @@
           <a:p>
             <a:fld id="{C953AA9C-1434-4059-A8DA-326E09552A92}" type="datetimeFigureOut">
               <a:rPr lang="es-CO" smtClean="0"/>
-              <a:t>2/01/2021</a:t>
+              <a:t>18/04/2021</a:t>
             </a:fld>
             <a:endParaRPr lang="es-CO"/>
           </a:p>
@@ -666,7 +671,7 @@
           <a:p>
             <a:fld id="{C953AA9C-1434-4059-A8DA-326E09552A92}" type="datetimeFigureOut">
               <a:rPr lang="es-CO" smtClean="0"/>
-              <a:t>2/01/2021</a:t>
+              <a:t>18/04/2021</a:t>
             </a:fld>
             <a:endParaRPr lang="es-CO"/>
           </a:p>
@@ -866,7 +871,7 @@
           <a:p>
             <a:fld id="{C953AA9C-1434-4059-A8DA-326E09552A92}" type="datetimeFigureOut">
               <a:rPr lang="es-CO" smtClean="0"/>
-              <a:t>2/01/2021</a:t>
+              <a:t>18/04/2021</a:t>
             </a:fld>
             <a:endParaRPr lang="es-CO"/>
           </a:p>
@@ -1142,7 +1147,7 @@
           <a:p>
             <a:fld id="{C953AA9C-1434-4059-A8DA-326E09552A92}" type="datetimeFigureOut">
               <a:rPr lang="es-CO" smtClean="0"/>
-              <a:t>2/01/2021</a:t>
+              <a:t>18/04/2021</a:t>
             </a:fld>
             <a:endParaRPr lang="es-CO"/>
           </a:p>
@@ -1410,7 +1415,7 @@
           <a:p>
             <a:fld id="{C953AA9C-1434-4059-A8DA-326E09552A92}" type="datetimeFigureOut">
               <a:rPr lang="es-CO" smtClean="0"/>
-              <a:t>2/01/2021</a:t>
+              <a:t>18/04/2021</a:t>
             </a:fld>
             <a:endParaRPr lang="es-CO"/>
           </a:p>
@@ -1825,7 +1830,7 @@
           <a:p>
             <a:fld id="{C953AA9C-1434-4059-A8DA-326E09552A92}" type="datetimeFigureOut">
               <a:rPr lang="es-CO" smtClean="0"/>
-              <a:t>2/01/2021</a:t>
+              <a:t>18/04/2021</a:t>
             </a:fld>
             <a:endParaRPr lang="es-CO"/>
           </a:p>
@@ -1967,7 +1972,7 @@
           <a:p>
             <a:fld id="{C953AA9C-1434-4059-A8DA-326E09552A92}" type="datetimeFigureOut">
               <a:rPr lang="es-CO" smtClean="0"/>
-              <a:t>2/01/2021</a:t>
+              <a:t>18/04/2021</a:t>
             </a:fld>
             <a:endParaRPr lang="es-CO"/>
           </a:p>
@@ -2080,7 +2085,7 @@
           <a:p>
             <a:fld id="{C953AA9C-1434-4059-A8DA-326E09552A92}" type="datetimeFigureOut">
               <a:rPr lang="es-CO" smtClean="0"/>
-              <a:t>2/01/2021</a:t>
+              <a:t>18/04/2021</a:t>
             </a:fld>
             <a:endParaRPr lang="es-CO"/>
           </a:p>
@@ -2393,7 +2398,7 @@
           <a:p>
             <a:fld id="{C953AA9C-1434-4059-A8DA-326E09552A92}" type="datetimeFigureOut">
               <a:rPr lang="es-CO" smtClean="0"/>
-              <a:t>2/01/2021</a:t>
+              <a:t>18/04/2021</a:t>
             </a:fld>
             <a:endParaRPr lang="es-CO"/>
           </a:p>
@@ -2682,7 +2687,7 @@
           <a:p>
             <a:fld id="{C953AA9C-1434-4059-A8DA-326E09552A92}" type="datetimeFigureOut">
               <a:rPr lang="es-CO" smtClean="0"/>
-              <a:t>2/01/2021</a:t>
+              <a:t>18/04/2021</a:t>
             </a:fld>
             <a:endParaRPr lang="es-CO"/>
           </a:p>
@@ -2925,7 +2930,7 @@
           <a:p>
             <a:fld id="{C953AA9C-1434-4059-A8DA-326E09552A92}" type="datetimeFigureOut">
               <a:rPr lang="es-CO" smtClean="0"/>
-              <a:t>2/01/2021</a:t>
+              <a:t>18/04/2021</a:t>
             </a:fld>
             <a:endParaRPr lang="es-CO"/>
           </a:p>
@@ -6369,7 +6374,7 @@
         </p:nvSpPr>
         <p:spPr>
           <a:xfrm>
-            <a:off x="4907411" y="4709803"/>
+            <a:off x="5437202" y="3595585"/>
             <a:ext cx="1788178" cy="682079"/>
           </a:xfrm>
           <a:prstGeom prst="roundRect">
@@ -6405,73 +6410,64 @@
           </a:p>
         </p:txBody>
       </p:sp>
-      <p:sp>
-        <p:nvSpPr>
-          <p:cNvPr id="5" name="Diagrama de flujo: disco magnético 4">
-            <a:extLst>
-              <a:ext uri="{FF2B5EF4-FFF2-40B4-BE49-F238E27FC236}">
-                <a16:creationId xmlns:a16="http://schemas.microsoft.com/office/drawing/2014/main" id="{84817B0B-C7D1-44A8-8E65-FF3D0E0498A3}"/>
-              </a:ext>
-            </a:extLst>
-          </p:cNvPr>
-          <p:cNvSpPr/>
+      <p:cxnSp>
+        <p:nvCxnSpPr>
+          <p:cNvPr id="7" name="Conector recto de flecha 6">
+            <a:extLst>
+              <a:ext uri="{FF2B5EF4-FFF2-40B4-BE49-F238E27FC236}">
+                <a16:creationId xmlns:a16="http://schemas.microsoft.com/office/drawing/2014/main" id="{BD3F95D3-AF7A-4DE3-A933-8144D304B853}"/>
+              </a:ext>
+            </a:extLst>
+          </p:cNvPr>
+          <p:cNvCxnSpPr>
+            <a:cxnSpLocks/>
+            <a:stCxn id="4" idx="2"/>
+          </p:cNvCxnSpPr>
           <p:nvPr/>
-        </p:nvSpPr>
+        </p:nvCxnSpPr>
         <p:spPr>
           <a:xfrm>
-            <a:off x="5392349" y="5850066"/>
-            <a:ext cx="818303" cy="981512"/>
+            <a:off x="6331291" y="4277664"/>
+            <a:ext cx="1" cy="458184"/>
           </a:xfrm>
-          <a:prstGeom prst="flowChartMagneticDisk">
+          <a:prstGeom prst="straightConnector1">
             <a:avLst/>
           </a:prstGeom>
+          <a:ln>
+            <a:headEnd type="triangle"/>
+            <a:tailEnd type="triangle"/>
+          </a:ln>
         </p:spPr>
         <p:style>
-          <a:lnRef idx="2">
-            <a:schemeClr val="accent1">
-              <a:shade val="50000"/>
-            </a:schemeClr>
+          <a:lnRef idx="1">
+            <a:schemeClr val="accent1"/>
           </a:lnRef>
-          <a:fillRef idx="1">
+          <a:fillRef idx="0">
             <a:schemeClr val="accent1"/>
           </a:fillRef>
           <a:effectRef idx="0">
             <a:schemeClr val="accent1"/>
           </a:effectRef>
           <a:fontRef idx="minor">
-            <a:schemeClr val="lt1"/>
+            <a:schemeClr val="tx1"/>
           </a:fontRef>
         </p:style>
-        <p:txBody>
-          <a:bodyPr rtlCol="0" anchor="ctr"/>
-          <a:lstStyle/>
-          <a:p>
-            <a:pPr algn="ctr"/>
-            <a:r>
-              <a:rPr lang="es-ES" dirty="0"/>
-              <a:t>DB</a:t>
-            </a:r>
-          </a:p>
-        </p:txBody>
-      </p:sp>
+      </p:cxnSp>
       <p:cxnSp>
         <p:nvCxnSpPr>
-          <p:cNvPr id="7" name="Conector recto de flecha 6">
-            <a:extLst>
-              <a:ext uri="{FF2B5EF4-FFF2-40B4-BE49-F238E27FC236}">
-                <a16:creationId xmlns:a16="http://schemas.microsoft.com/office/drawing/2014/main" id="{BD3F95D3-AF7A-4DE3-A933-8144D304B853}"/>
-              </a:ext>
-            </a:extLst>
-          </p:cNvPr>
-          <p:cNvCxnSpPr>
-            <a:stCxn id="4" idx="2"/>
-            <a:endCxn id="5" idx="1"/>
-          </p:cNvCxnSpPr>
+          <p:cNvPr id="26" name="Conector recto de flecha 25">
+            <a:extLst>
+              <a:ext uri="{FF2B5EF4-FFF2-40B4-BE49-F238E27FC236}">
+                <a16:creationId xmlns:a16="http://schemas.microsoft.com/office/drawing/2014/main" id="{141023E5-15F6-4E8C-AA9F-88E209525DB3}"/>
+              </a:ext>
+            </a:extLst>
+          </p:cNvPr>
+          <p:cNvCxnSpPr/>
           <p:nvPr/>
         </p:nvCxnSpPr>
         <p:spPr>
           <a:xfrm>
-            <a:off x="5801500" y="5391882"/>
+            <a:off x="6341861" y="3009158"/>
             <a:ext cx="1" cy="458184"/>
           </a:xfrm>
           <a:prstGeom prst="straightConnector1">
@@ -6499,10 +6495,10 @@
       </p:cxnSp>
       <p:sp>
         <p:nvSpPr>
-          <p:cNvPr id="25" name="Rectángulo: esquinas redondeadas 24">
-            <a:extLst>
-              <a:ext uri="{FF2B5EF4-FFF2-40B4-BE49-F238E27FC236}">
-                <a16:creationId xmlns:a16="http://schemas.microsoft.com/office/drawing/2014/main" id="{ADCB685E-994E-4477-8EF5-3A9D694B3CA0}"/>
+          <p:cNvPr id="29" name="Rectángulo: esquinas redondeadas 28">
+            <a:extLst>
+              <a:ext uri="{FF2B5EF4-FFF2-40B4-BE49-F238E27FC236}">
+                <a16:creationId xmlns:a16="http://schemas.microsoft.com/office/drawing/2014/main" id="{652E3FFA-0EA8-45AA-9925-7C84EE4DB4B9}"/>
               </a:ext>
             </a:extLst>
           </p:cNvPr>
@@ -6511,7 +6507,56 @@
         </p:nvSpPr>
         <p:spPr>
           <a:xfrm>
-            <a:off x="4907411" y="3570948"/>
+            <a:off x="1331650" y="6005401"/>
+            <a:ext cx="9960745" cy="682079"/>
+          </a:xfrm>
+          <a:prstGeom prst="roundRect">
+            <a:avLst/>
+          </a:prstGeom>
+        </p:spPr>
+        <p:style>
+          <a:lnRef idx="2">
+            <a:schemeClr val="accent1">
+              <a:shade val="50000"/>
+            </a:schemeClr>
+          </a:lnRef>
+          <a:fillRef idx="1">
+            <a:schemeClr val="accent1"/>
+          </a:fillRef>
+          <a:effectRef idx="0">
+            <a:schemeClr val="accent1"/>
+          </a:effectRef>
+          <a:fontRef idx="minor">
+            <a:schemeClr val="lt1"/>
+          </a:fontRef>
+        </p:style>
+        <p:txBody>
+          <a:bodyPr rtlCol="0" anchor="ctr"/>
+          <a:lstStyle/>
+          <a:p>
+            <a:pPr algn="ctr"/>
+            <a:r>
+              <a:rPr lang="es-ES" dirty="0"/>
+              <a:t>Eureka Server (Balanceo de Carga)</a:t>
+            </a:r>
+          </a:p>
+        </p:txBody>
+      </p:sp>
+      <p:sp>
+        <p:nvSpPr>
+          <p:cNvPr id="30" name="Rectángulo: esquinas redondeadas 29">
+            <a:extLst>
+              <a:ext uri="{FF2B5EF4-FFF2-40B4-BE49-F238E27FC236}">
+                <a16:creationId xmlns:a16="http://schemas.microsoft.com/office/drawing/2014/main" id="{30083C7A-723A-4AB7-ADCC-08A4855591BD}"/>
+              </a:ext>
+            </a:extLst>
+          </p:cNvPr>
+          <p:cNvSpPr/>
+          <p:nvPr/>
+        </p:nvSpPr>
+        <p:spPr>
+          <a:xfrm>
+            <a:off x="9513384" y="2166619"/>
             <a:ext cx="1788178" cy="682079"/>
           </a:xfrm>
           <a:prstGeom prst="roundRect">
@@ -6540,194 +6585,6 @@
           <a:p>
             <a:pPr algn="ctr"/>
             <a:r>
-              <a:rPr lang="es-ES" dirty="0"/>
-              <a:t>Servicio-cliente</a:t>
-            </a:r>
-          </a:p>
-        </p:txBody>
-      </p:sp>
-      <p:cxnSp>
-        <p:nvCxnSpPr>
-          <p:cNvPr id="26" name="Conector recto de flecha 25">
-            <a:extLst>
-              <a:ext uri="{FF2B5EF4-FFF2-40B4-BE49-F238E27FC236}">
-                <a16:creationId xmlns:a16="http://schemas.microsoft.com/office/drawing/2014/main" id="{141023E5-15F6-4E8C-AA9F-88E209525DB3}"/>
-              </a:ext>
-            </a:extLst>
-          </p:cNvPr>
-          <p:cNvCxnSpPr/>
-          <p:nvPr/>
-        </p:nvCxnSpPr>
-        <p:spPr>
-          <a:xfrm>
-            <a:off x="5801499" y="4251619"/>
-            <a:ext cx="1" cy="458184"/>
-          </a:xfrm>
-          <a:prstGeom prst="straightConnector1">
-            <a:avLst/>
-          </a:prstGeom>
-          <a:ln>
-            <a:headEnd type="triangle"/>
-            <a:tailEnd type="triangle"/>
-          </a:ln>
-        </p:spPr>
-        <p:style>
-          <a:lnRef idx="1">
-            <a:schemeClr val="accent1"/>
-          </a:lnRef>
-          <a:fillRef idx="0">
-            <a:schemeClr val="accent1"/>
-          </a:fillRef>
-          <a:effectRef idx="0">
-            <a:schemeClr val="accent1"/>
-          </a:effectRef>
-          <a:fontRef idx="minor">
-            <a:schemeClr val="tx1"/>
-          </a:fontRef>
-        </p:style>
-      </p:cxnSp>
-      <p:sp>
-        <p:nvSpPr>
-          <p:cNvPr id="28" name="Rectángulo: esquinas redondeadas 27">
-            <a:extLst>
-              <a:ext uri="{FF2B5EF4-FFF2-40B4-BE49-F238E27FC236}">
-                <a16:creationId xmlns:a16="http://schemas.microsoft.com/office/drawing/2014/main" id="{D65DCF4F-B441-42FF-8686-155BA1366EE0}"/>
-              </a:ext>
-            </a:extLst>
-          </p:cNvPr>
-          <p:cNvSpPr/>
-          <p:nvPr/>
-        </p:nvSpPr>
-        <p:spPr>
-          <a:xfrm>
-            <a:off x="5059811" y="4862203"/>
-            <a:ext cx="1788178" cy="682079"/>
-          </a:xfrm>
-          <a:prstGeom prst="roundRect">
-            <a:avLst/>
-          </a:prstGeom>
-        </p:spPr>
-        <p:style>
-          <a:lnRef idx="2">
-            <a:schemeClr val="accent1">
-              <a:shade val="50000"/>
-            </a:schemeClr>
-          </a:lnRef>
-          <a:fillRef idx="1">
-            <a:schemeClr val="accent1"/>
-          </a:fillRef>
-          <a:effectRef idx="0">
-            <a:schemeClr val="accent1"/>
-          </a:effectRef>
-          <a:fontRef idx="minor">
-            <a:schemeClr val="lt1"/>
-          </a:fontRef>
-        </p:style>
-        <p:txBody>
-          <a:bodyPr rtlCol="0" anchor="ctr"/>
-          <a:lstStyle/>
-          <a:p>
-            <a:pPr algn="ctr"/>
-            <a:r>
-              <a:rPr lang="es-ES" dirty="0"/>
-              <a:t>Servicio-personas</a:t>
-            </a:r>
-            <a:endParaRPr lang="es-CO" dirty="0"/>
-          </a:p>
-        </p:txBody>
-      </p:sp>
-      <p:sp>
-        <p:nvSpPr>
-          <p:cNvPr id="29" name="Rectángulo: esquinas redondeadas 28">
-            <a:extLst>
-              <a:ext uri="{FF2B5EF4-FFF2-40B4-BE49-F238E27FC236}">
-                <a16:creationId xmlns:a16="http://schemas.microsoft.com/office/drawing/2014/main" id="{652E3FFA-0EA8-45AA-9925-7C84EE4DB4B9}"/>
-              </a:ext>
-            </a:extLst>
-          </p:cNvPr>
-          <p:cNvSpPr/>
-          <p:nvPr/>
-        </p:nvSpPr>
-        <p:spPr>
-          <a:xfrm>
-            <a:off x="1247058" y="4180124"/>
-            <a:ext cx="1788178" cy="682079"/>
-          </a:xfrm>
-          <a:prstGeom prst="roundRect">
-            <a:avLst/>
-          </a:prstGeom>
-        </p:spPr>
-        <p:style>
-          <a:lnRef idx="2">
-            <a:schemeClr val="accent1">
-              <a:shade val="50000"/>
-            </a:schemeClr>
-          </a:lnRef>
-          <a:fillRef idx="1">
-            <a:schemeClr val="accent1"/>
-          </a:fillRef>
-          <a:effectRef idx="0">
-            <a:schemeClr val="accent1"/>
-          </a:effectRef>
-          <a:fontRef idx="minor">
-            <a:schemeClr val="lt1"/>
-          </a:fontRef>
-        </p:style>
-        <p:txBody>
-          <a:bodyPr rtlCol="0" anchor="ctr"/>
-          <a:lstStyle/>
-          <a:p>
-            <a:pPr algn="ctr"/>
-            <a:r>
-              <a:rPr lang="es-ES" dirty="0"/>
-              <a:t>Eureka Server</a:t>
-            </a:r>
-          </a:p>
-        </p:txBody>
-      </p:sp>
-      <p:sp>
-        <p:nvSpPr>
-          <p:cNvPr id="30" name="Rectángulo: esquinas redondeadas 29">
-            <a:extLst>
-              <a:ext uri="{FF2B5EF4-FFF2-40B4-BE49-F238E27FC236}">
-                <a16:creationId xmlns:a16="http://schemas.microsoft.com/office/drawing/2014/main" id="{30083C7A-723A-4AB7-ADCC-08A4855591BD}"/>
-              </a:ext>
-            </a:extLst>
-          </p:cNvPr>
-          <p:cNvSpPr/>
-          <p:nvPr/>
-        </p:nvSpPr>
-        <p:spPr>
-          <a:xfrm>
-            <a:off x="8098983" y="3566763"/>
-            <a:ext cx="1788178" cy="682079"/>
-          </a:xfrm>
-          <a:prstGeom prst="roundRect">
-            <a:avLst/>
-          </a:prstGeom>
-        </p:spPr>
-        <p:style>
-          <a:lnRef idx="2">
-            <a:schemeClr val="accent1">
-              <a:shade val="50000"/>
-            </a:schemeClr>
-          </a:lnRef>
-          <a:fillRef idx="1">
-            <a:schemeClr val="accent1"/>
-          </a:fillRef>
-          <a:effectRef idx="0">
-            <a:schemeClr val="accent1"/>
-          </a:effectRef>
-          <a:fontRef idx="minor">
-            <a:schemeClr val="lt1"/>
-          </a:fontRef>
-        </p:style>
-        <p:txBody>
-          <a:bodyPr rtlCol="0" anchor="ctr"/>
-          <a:lstStyle/>
-          <a:p>
-            <a:pPr algn="ctr"/>
-            <a:r>
               <a:rPr lang="es-ES" dirty="0" err="1"/>
               <a:t>Config</a:t>
             </a:r>
@@ -6740,65 +6597,22 @@
       </p:sp>
       <p:cxnSp>
         <p:nvCxnSpPr>
-          <p:cNvPr id="13" name="Conector recto de flecha 12">
-            <a:extLst>
-              <a:ext uri="{FF2B5EF4-FFF2-40B4-BE49-F238E27FC236}">
-                <a16:creationId xmlns:a16="http://schemas.microsoft.com/office/drawing/2014/main" id="{1344E26C-5F8C-43CE-892F-FDE7F01DD912}"/>
+          <p:cNvPr id="33" name="Conector recto de flecha 32">
+            <a:extLst>
+              <a:ext uri="{FF2B5EF4-FFF2-40B4-BE49-F238E27FC236}">
+                <a16:creationId xmlns:a16="http://schemas.microsoft.com/office/drawing/2014/main" id="{06B63B09-694D-4FCD-B40E-DEE361677AA5}"/>
               </a:ext>
             </a:extLst>
           </p:cNvPr>
           <p:cNvCxnSpPr>
             <a:cxnSpLocks/>
-            <a:endCxn id="25" idx="1"/>
-          </p:cNvCxnSpPr>
-          <p:nvPr/>
-        </p:nvCxnSpPr>
-        <p:spPr>
-          <a:xfrm flipV="1">
-            <a:off x="3048315" y="3911988"/>
-            <a:ext cx="1859096" cy="598114"/>
-          </a:xfrm>
-          <a:prstGeom prst="straightConnector1">
-            <a:avLst/>
-          </a:prstGeom>
-          <a:ln>
-            <a:headEnd type="triangle"/>
-            <a:tailEnd type="triangle"/>
-          </a:ln>
-        </p:spPr>
-        <p:style>
-          <a:lnRef idx="1">
-            <a:schemeClr val="accent1"/>
-          </a:lnRef>
-          <a:fillRef idx="0">
-            <a:schemeClr val="accent1"/>
-          </a:fillRef>
-          <a:effectRef idx="0">
-            <a:schemeClr val="accent1"/>
-          </a:effectRef>
-          <a:fontRef idx="minor">
-            <a:schemeClr val="tx1"/>
-          </a:fontRef>
-        </p:style>
-      </p:cxnSp>
-      <p:cxnSp>
-        <p:nvCxnSpPr>
-          <p:cNvPr id="33" name="Conector recto de flecha 32">
-            <a:extLst>
-              <a:ext uri="{FF2B5EF4-FFF2-40B4-BE49-F238E27FC236}">
-                <a16:creationId xmlns:a16="http://schemas.microsoft.com/office/drawing/2014/main" id="{06B63B09-694D-4FCD-B40E-DEE361677AA5}"/>
-              </a:ext>
-            </a:extLst>
-          </p:cNvPr>
-          <p:cNvCxnSpPr>
-            <a:stCxn id="4" idx="1"/>
           </p:cNvCxnSpPr>
           <p:nvPr/>
         </p:nvCxnSpPr>
         <p:spPr>
           <a:xfrm flipH="1" flipV="1">
-            <a:off x="3048315" y="4709803"/>
-            <a:ext cx="1859096" cy="341040"/>
+            <a:off x="6995867" y="4255576"/>
+            <a:ext cx="17889" cy="1768856"/>
           </a:xfrm>
           <a:prstGeom prst="straightConnector1">
             <a:avLst/>
@@ -6833,107 +6647,15 @@
             </a:extLst>
           </p:cNvPr>
           <p:cNvCxnSpPr>
-            <a:stCxn id="25" idx="3"/>
+            <a:cxnSpLocks/>
             <a:endCxn id="30" idx="1"/>
           </p:cNvCxnSpPr>
           <p:nvPr/>
         </p:nvCxnSpPr>
         <p:spPr>
-          <a:xfrm flipV="1">
-            <a:off x="6695589" y="3907803"/>
-            <a:ext cx="1403394" cy="4185"/>
-          </a:xfrm>
-          <a:prstGeom prst="straightConnector1">
-            <a:avLst/>
-          </a:prstGeom>
-          <a:ln>
-            <a:headEnd type="triangle"/>
-            <a:tailEnd type="triangle"/>
-          </a:ln>
-        </p:spPr>
-        <p:style>
-          <a:lnRef idx="1">
-            <a:schemeClr val="accent1"/>
-          </a:lnRef>
-          <a:fillRef idx="0">
-            <a:schemeClr val="accent1"/>
-          </a:fillRef>
-          <a:effectRef idx="0">
-            <a:schemeClr val="accent1"/>
-          </a:effectRef>
-          <a:fontRef idx="minor">
-            <a:schemeClr val="tx1"/>
-          </a:fontRef>
-        </p:style>
-      </p:cxnSp>
-      <p:sp>
-        <p:nvSpPr>
-          <p:cNvPr id="36" name="Rectángulo: esquinas redondeadas 35">
-            <a:extLst>
-              <a:ext uri="{FF2B5EF4-FFF2-40B4-BE49-F238E27FC236}">
-                <a16:creationId xmlns:a16="http://schemas.microsoft.com/office/drawing/2014/main" id="{6D359E0B-3DDE-4D78-AD29-D7B8D2436CE9}"/>
-              </a:ext>
-            </a:extLst>
-          </p:cNvPr>
-          <p:cNvSpPr/>
-          <p:nvPr/>
-        </p:nvSpPr>
-        <p:spPr>
           <a:xfrm>
-            <a:off x="4923259" y="1982996"/>
-            <a:ext cx="1788178" cy="682079"/>
-          </a:xfrm>
-          <a:prstGeom prst="roundRect">
-            <a:avLst/>
-          </a:prstGeom>
-        </p:spPr>
-        <p:style>
-          <a:lnRef idx="2">
-            <a:schemeClr val="accent1">
-              <a:shade val="50000"/>
-            </a:schemeClr>
-          </a:lnRef>
-          <a:fillRef idx="1">
-            <a:schemeClr val="accent1"/>
-          </a:fillRef>
-          <a:effectRef idx="0">
-            <a:schemeClr val="accent1"/>
-          </a:effectRef>
-          <a:fontRef idx="minor">
-            <a:schemeClr val="lt1"/>
-          </a:fontRef>
-        </p:style>
-        <p:txBody>
-          <a:bodyPr rtlCol="0" anchor="ctr"/>
-          <a:lstStyle/>
-          <a:p>
-            <a:pPr algn="ctr"/>
-            <a:r>
-              <a:rPr lang="es-ES" dirty="0"/>
-              <a:t>Gateway</a:t>
-            </a:r>
-          </a:p>
-        </p:txBody>
-      </p:sp>
-      <p:cxnSp>
-        <p:nvCxnSpPr>
-          <p:cNvPr id="38" name="Conector recto de flecha 37">
-            <a:extLst>
-              <a:ext uri="{FF2B5EF4-FFF2-40B4-BE49-F238E27FC236}">
-                <a16:creationId xmlns:a16="http://schemas.microsoft.com/office/drawing/2014/main" id="{1DBEB7F8-9F04-41DD-AF5A-97BB8B1B496A}"/>
-              </a:ext>
-            </a:extLst>
-          </p:cNvPr>
-          <p:cNvCxnSpPr>
-            <a:stCxn id="36" idx="2"/>
-            <a:endCxn id="25" idx="0"/>
-          </p:cNvCxnSpPr>
-          <p:nvPr/>
-        </p:nvCxnSpPr>
-        <p:spPr>
-          <a:xfrm flipH="1">
-            <a:off x="5801500" y="2665075"/>
-            <a:ext cx="15848" cy="905873"/>
+            <a:off x="7235950" y="2487760"/>
+            <a:ext cx="2277434" cy="19899"/>
           </a:xfrm>
           <a:prstGeom prst="straightConnector1">
             <a:avLst/>
@@ -6972,7 +6694,7 @@
         </p:nvSpPr>
         <p:spPr>
           <a:xfrm>
-            <a:off x="8488411" y="4893184"/>
+            <a:off x="10637952" y="3467118"/>
             <a:ext cx="885262" cy="620116"/>
           </a:xfrm>
           <a:prstGeom prst="flowChartMultidocument">
@@ -7019,14 +6741,13 @@
           </p:cNvPr>
           <p:cNvCxnSpPr>
             <a:cxnSpLocks/>
-            <a:stCxn id="30" idx="2"/>
             <a:endCxn id="39" idx="0"/>
           </p:cNvCxnSpPr>
           <p:nvPr/>
         </p:nvCxnSpPr>
         <p:spPr>
           <a:xfrm flipH="1">
-            <a:off x="8991945" y="4248842"/>
+            <a:off x="11141486" y="2822776"/>
             <a:ext cx="1127" cy="644342"/>
           </a:xfrm>
           <a:prstGeom prst="straightConnector1">
@@ -7054,10 +6775,10 @@
       </p:cxnSp>
       <p:sp>
         <p:nvSpPr>
-          <p:cNvPr id="46" name="Bocadillo: rectángulo con esquinas redondeadas 45">
-            <a:extLst>
-              <a:ext uri="{FF2B5EF4-FFF2-40B4-BE49-F238E27FC236}">
-                <a16:creationId xmlns:a16="http://schemas.microsoft.com/office/drawing/2014/main" id="{4CA0712F-511F-429A-A430-A22428A32846}"/>
+          <p:cNvPr id="32" name="Rectángulo: esquinas redondeadas 31">
+            <a:extLst>
+              <a:ext uri="{FF2B5EF4-FFF2-40B4-BE49-F238E27FC236}">
+                <a16:creationId xmlns:a16="http://schemas.microsoft.com/office/drawing/2014/main" id="{C94C48D1-7099-43BF-91A4-0CF495F57334}"/>
               </a:ext>
             </a:extLst>
           </p:cNvPr>
@@ -7066,14 +6787,61 @@
         </p:nvSpPr>
         <p:spPr>
           <a:xfrm>
-            <a:off x="2544727" y="5391881"/>
-            <a:ext cx="1213540" cy="540741"/>
+            <a:off x="482969" y="3121989"/>
+            <a:ext cx="1895856" cy="682079"/>
           </a:xfrm>
-          <a:prstGeom prst="wedgeRoundRectCallout">
+          <a:prstGeom prst="roundRect">
+            <a:avLst/>
+          </a:prstGeom>
+        </p:spPr>
+        <p:style>
+          <a:lnRef idx="2">
+            <a:schemeClr val="accent1">
+              <a:shade val="50000"/>
+            </a:schemeClr>
+          </a:lnRef>
+          <a:fillRef idx="1">
+            <a:schemeClr val="accent1"/>
+          </a:fillRef>
+          <a:effectRef idx="0">
+            <a:schemeClr val="accent1"/>
+          </a:effectRef>
+          <a:fontRef idx="minor">
+            <a:schemeClr val="lt1"/>
+          </a:fontRef>
+        </p:style>
+        <p:txBody>
+          <a:bodyPr rtlCol="0" anchor="ctr"/>
+          <a:lstStyle/>
+          <a:p>
+            <a:pPr algn="ctr"/>
+            <a:r>
+              <a:rPr lang="es-ES" dirty="0"/>
+              <a:t>Servicio-usuarios</a:t>
+            </a:r>
+          </a:p>
+        </p:txBody>
+      </p:sp>
+      <p:sp>
+        <p:nvSpPr>
+          <p:cNvPr id="34" name="Rectángulo: esquinas redondeadas 33">
+            <a:extLst>
+              <a:ext uri="{FF2B5EF4-FFF2-40B4-BE49-F238E27FC236}">
+                <a16:creationId xmlns:a16="http://schemas.microsoft.com/office/drawing/2014/main" id="{E4C06B98-E7B7-4451-A010-B0B8E2DBFF69}"/>
+              </a:ext>
+            </a:extLst>
+          </p:cNvPr>
+          <p:cNvSpPr/>
+          <p:nvPr/>
+        </p:nvSpPr>
+        <p:spPr>
+          <a:xfrm>
+            <a:off x="482969" y="1945627"/>
+            <a:ext cx="1895856" cy="682079"/>
+          </a:xfrm>
+          <a:prstGeom prst="roundRect">
             <a:avLst>
-              <a:gd name="adj1" fmla="val 61304"/>
-              <a:gd name="adj2" fmla="val -146351"/>
-              <a:gd name="adj3" fmla="val 16667"/>
+              <a:gd name="adj" fmla="val 19270"/>
             </a:avLst>
           </a:prstGeom>
         </p:spPr>
@@ -7100,12 +6868,549 @@
             <a:pPr algn="ctr"/>
             <a:r>
               <a:rPr lang="es-ES" dirty="0"/>
-              <a:t>Balanceo de carga</a:t>
+              <a:t>Servicio-</a:t>
             </a:r>
-            <a:endParaRPr lang="es-CO" dirty="0"/>
+            <a:r>
+              <a:rPr lang="es-ES" dirty="0" err="1"/>
+              <a:t>oauth</a:t>
+            </a:r>
+            <a:endParaRPr lang="es-ES" dirty="0"/>
           </a:p>
         </p:txBody>
       </p:sp>
+      <p:cxnSp>
+        <p:nvCxnSpPr>
+          <p:cNvPr id="6" name="Conector recto de flecha 5">
+            <a:extLst>
+              <a:ext uri="{FF2B5EF4-FFF2-40B4-BE49-F238E27FC236}">
+                <a16:creationId xmlns:a16="http://schemas.microsoft.com/office/drawing/2014/main" id="{5B7FA3F1-CADF-4FB4-B902-69BE05789696}"/>
+              </a:ext>
+            </a:extLst>
+          </p:cNvPr>
+          <p:cNvCxnSpPr>
+            <a:cxnSpLocks/>
+            <a:stCxn id="34" idx="2"/>
+          </p:cNvCxnSpPr>
+          <p:nvPr/>
+        </p:nvCxnSpPr>
+        <p:spPr>
+          <a:xfrm>
+            <a:off x="1430897" y="2627706"/>
+            <a:ext cx="153" cy="494283"/>
+          </a:xfrm>
+          <a:prstGeom prst="straightConnector1">
+            <a:avLst/>
+          </a:prstGeom>
+          <a:ln>
+            <a:tailEnd type="triangle"/>
+          </a:ln>
+        </p:spPr>
+        <p:style>
+          <a:lnRef idx="1">
+            <a:schemeClr val="accent1"/>
+          </a:lnRef>
+          <a:fillRef idx="0">
+            <a:schemeClr val="accent1"/>
+          </a:fillRef>
+          <a:effectRef idx="0">
+            <a:schemeClr val="accent1"/>
+          </a:effectRef>
+          <a:fontRef idx="minor">
+            <a:schemeClr val="tx1"/>
+          </a:fontRef>
+        </p:style>
+      </p:cxnSp>
+      <p:cxnSp>
+        <p:nvCxnSpPr>
+          <p:cNvPr id="27" name="Conector: angular 26">
+            <a:extLst>
+              <a:ext uri="{FF2B5EF4-FFF2-40B4-BE49-F238E27FC236}">
+                <a16:creationId xmlns:a16="http://schemas.microsoft.com/office/drawing/2014/main" id="{B3516417-309E-4FB7-BD62-549FA70C072F}"/>
+              </a:ext>
+            </a:extLst>
+          </p:cNvPr>
+          <p:cNvCxnSpPr>
+            <a:cxnSpLocks/>
+            <a:endCxn id="68" idx="2"/>
+          </p:cNvCxnSpPr>
+          <p:nvPr/>
+        </p:nvCxnSpPr>
+        <p:spPr>
+          <a:xfrm>
+            <a:off x="1945199" y="3777836"/>
+            <a:ext cx="3972267" cy="1438922"/>
+          </a:xfrm>
+          <a:prstGeom prst="bentConnector3">
+            <a:avLst>
+              <a:gd name="adj1" fmla="val 162"/>
+            </a:avLst>
+          </a:prstGeom>
+          <a:ln>
+            <a:tailEnd type="triangle"/>
+          </a:ln>
+        </p:spPr>
+        <p:style>
+          <a:lnRef idx="1">
+            <a:schemeClr val="accent1"/>
+          </a:lnRef>
+          <a:fillRef idx="0">
+            <a:schemeClr val="accent1"/>
+          </a:fillRef>
+          <a:effectRef idx="0">
+            <a:schemeClr val="accent1"/>
+          </a:effectRef>
+          <a:fontRef idx="minor">
+            <a:schemeClr val="tx1"/>
+          </a:fontRef>
+        </p:style>
+      </p:cxnSp>
+      <p:cxnSp>
+        <p:nvCxnSpPr>
+          <p:cNvPr id="61" name="Conector recto de flecha 60">
+            <a:extLst>
+              <a:ext uri="{FF2B5EF4-FFF2-40B4-BE49-F238E27FC236}">
+                <a16:creationId xmlns:a16="http://schemas.microsoft.com/office/drawing/2014/main" id="{2BF0299B-193B-4CAC-8C64-9CFB93927C77}"/>
+              </a:ext>
+            </a:extLst>
+          </p:cNvPr>
+          <p:cNvCxnSpPr>
+            <a:cxnSpLocks/>
+            <a:stCxn id="32" idx="2"/>
+          </p:cNvCxnSpPr>
+          <p:nvPr/>
+        </p:nvCxnSpPr>
+        <p:spPr>
+          <a:xfrm>
+            <a:off x="1430897" y="3804068"/>
+            <a:ext cx="31125" cy="2196217"/>
+          </a:xfrm>
+          <a:prstGeom prst="straightConnector1">
+            <a:avLst/>
+          </a:prstGeom>
+          <a:ln>
+            <a:headEnd type="triangle"/>
+            <a:tailEnd type="triangle"/>
+          </a:ln>
+        </p:spPr>
+        <p:style>
+          <a:lnRef idx="1">
+            <a:schemeClr val="accent1"/>
+          </a:lnRef>
+          <a:fillRef idx="0">
+            <a:schemeClr val="accent1"/>
+          </a:fillRef>
+          <a:effectRef idx="0">
+            <a:schemeClr val="accent1"/>
+          </a:effectRef>
+          <a:fontRef idx="minor">
+            <a:schemeClr val="tx1"/>
+          </a:fontRef>
+        </p:style>
+      </p:cxnSp>
+      <p:cxnSp>
+        <p:nvCxnSpPr>
+          <p:cNvPr id="66" name="Conector: angular 65">
+            <a:extLst>
+              <a:ext uri="{FF2B5EF4-FFF2-40B4-BE49-F238E27FC236}">
+                <a16:creationId xmlns:a16="http://schemas.microsoft.com/office/drawing/2014/main" id="{FBDA6BCE-BFEE-4855-B78E-8830AA1662AA}"/>
+              </a:ext>
+            </a:extLst>
+          </p:cNvPr>
+          <p:cNvCxnSpPr>
+            <a:cxnSpLocks/>
+            <a:stCxn id="69" idx="3"/>
+          </p:cNvCxnSpPr>
+          <p:nvPr/>
+        </p:nvCxnSpPr>
+        <p:spPr>
+          <a:xfrm>
+            <a:off x="7235950" y="2580337"/>
+            <a:ext cx="909000" cy="3393879"/>
+          </a:xfrm>
+          <a:prstGeom prst="bentConnector2">
+            <a:avLst/>
+          </a:prstGeom>
+          <a:ln>
+            <a:headEnd type="triangle"/>
+            <a:tailEnd type="triangle"/>
+          </a:ln>
+        </p:spPr>
+        <p:style>
+          <a:lnRef idx="1">
+            <a:schemeClr val="accent1"/>
+          </a:lnRef>
+          <a:fillRef idx="0">
+            <a:schemeClr val="accent1"/>
+          </a:fillRef>
+          <a:effectRef idx="0">
+            <a:schemeClr val="accent1"/>
+          </a:effectRef>
+          <a:fontRef idx="minor">
+            <a:schemeClr val="tx1"/>
+          </a:fontRef>
+        </p:style>
+      </p:cxnSp>
+      <p:sp>
+        <p:nvSpPr>
+          <p:cNvPr id="68" name="Diagrama de flujo: disco magnético 67">
+            <a:extLst>
+              <a:ext uri="{FF2B5EF4-FFF2-40B4-BE49-F238E27FC236}">
+                <a16:creationId xmlns:a16="http://schemas.microsoft.com/office/drawing/2014/main" id="{AD2DCA16-370E-4DEE-9AC4-00CE05C8758B}"/>
+              </a:ext>
+            </a:extLst>
+          </p:cNvPr>
+          <p:cNvSpPr/>
+          <p:nvPr/>
+        </p:nvSpPr>
+        <p:spPr>
+          <a:xfrm>
+            <a:off x="5917466" y="4726002"/>
+            <a:ext cx="818303" cy="981512"/>
+          </a:xfrm>
+          <a:prstGeom prst="flowChartMagneticDisk">
+            <a:avLst/>
+          </a:prstGeom>
+        </p:spPr>
+        <p:style>
+          <a:lnRef idx="2">
+            <a:schemeClr val="accent1">
+              <a:shade val="50000"/>
+            </a:schemeClr>
+          </a:lnRef>
+          <a:fillRef idx="1">
+            <a:schemeClr val="accent1"/>
+          </a:fillRef>
+          <a:effectRef idx="0">
+            <a:schemeClr val="accent1"/>
+          </a:effectRef>
+          <a:fontRef idx="minor">
+            <a:schemeClr val="lt1"/>
+          </a:fontRef>
+        </p:style>
+        <p:txBody>
+          <a:bodyPr rtlCol="0" anchor="ctr"/>
+          <a:lstStyle/>
+          <a:p>
+            <a:pPr algn="ctr"/>
+            <a:r>
+              <a:rPr lang="es-ES" dirty="0"/>
+              <a:t>DB</a:t>
+            </a:r>
+          </a:p>
+        </p:txBody>
+      </p:sp>
+      <p:sp>
+        <p:nvSpPr>
+          <p:cNvPr id="69" name="Rectángulo: esquinas redondeadas 68">
+            <a:extLst>
+              <a:ext uri="{FF2B5EF4-FFF2-40B4-BE49-F238E27FC236}">
+                <a16:creationId xmlns:a16="http://schemas.microsoft.com/office/drawing/2014/main" id="{0B4CDF22-93DE-44EC-B2EC-A539CAEA4C30}"/>
+              </a:ext>
+            </a:extLst>
+          </p:cNvPr>
+          <p:cNvSpPr/>
+          <p:nvPr/>
+        </p:nvSpPr>
+        <p:spPr>
+          <a:xfrm>
+            <a:off x="5447772" y="2239297"/>
+            <a:ext cx="1788178" cy="682079"/>
+          </a:xfrm>
+          <a:prstGeom prst="roundRect">
+            <a:avLst/>
+          </a:prstGeom>
+        </p:spPr>
+        <p:style>
+          <a:lnRef idx="2">
+            <a:schemeClr val="accent1">
+              <a:shade val="50000"/>
+            </a:schemeClr>
+          </a:lnRef>
+          <a:fillRef idx="1">
+            <a:schemeClr val="accent1"/>
+          </a:fillRef>
+          <a:effectRef idx="0">
+            <a:schemeClr val="accent1"/>
+          </a:effectRef>
+          <a:fontRef idx="minor">
+            <a:schemeClr val="lt1"/>
+          </a:fontRef>
+        </p:style>
+        <p:txBody>
+          <a:bodyPr rtlCol="0" anchor="ctr"/>
+          <a:lstStyle/>
+          <a:p>
+            <a:pPr algn="ctr"/>
+            <a:r>
+              <a:rPr lang="es-ES" dirty="0"/>
+              <a:t>Servicio-cliente</a:t>
+            </a:r>
+          </a:p>
+        </p:txBody>
+      </p:sp>
+      <p:sp>
+        <p:nvSpPr>
+          <p:cNvPr id="71" name="Rectángulo: esquinas redondeadas 70">
+            <a:extLst>
+              <a:ext uri="{FF2B5EF4-FFF2-40B4-BE49-F238E27FC236}">
+                <a16:creationId xmlns:a16="http://schemas.microsoft.com/office/drawing/2014/main" id="{EBC3FA1F-5544-4346-AFE8-82A167C19D6E}"/>
+              </a:ext>
+            </a:extLst>
+          </p:cNvPr>
+          <p:cNvSpPr/>
+          <p:nvPr/>
+        </p:nvSpPr>
+        <p:spPr>
+          <a:xfrm>
+            <a:off x="5429154" y="833568"/>
+            <a:ext cx="1788178" cy="682079"/>
+          </a:xfrm>
+          <a:prstGeom prst="roundRect">
+            <a:avLst/>
+          </a:prstGeom>
+        </p:spPr>
+        <p:style>
+          <a:lnRef idx="2">
+            <a:schemeClr val="accent1">
+              <a:shade val="50000"/>
+            </a:schemeClr>
+          </a:lnRef>
+          <a:fillRef idx="1">
+            <a:schemeClr val="accent1"/>
+          </a:fillRef>
+          <a:effectRef idx="0">
+            <a:schemeClr val="accent1"/>
+          </a:effectRef>
+          <a:fontRef idx="minor">
+            <a:schemeClr val="lt1"/>
+          </a:fontRef>
+        </p:style>
+        <p:txBody>
+          <a:bodyPr rtlCol="0" anchor="ctr"/>
+          <a:lstStyle/>
+          <a:p>
+            <a:pPr algn="ctr"/>
+            <a:r>
+              <a:rPr lang="es-ES" dirty="0"/>
+              <a:t>Gateway</a:t>
+            </a:r>
+          </a:p>
+        </p:txBody>
+      </p:sp>
+      <p:cxnSp>
+        <p:nvCxnSpPr>
+          <p:cNvPr id="72" name="Conector recto de flecha 71">
+            <a:extLst>
+              <a:ext uri="{FF2B5EF4-FFF2-40B4-BE49-F238E27FC236}">
+                <a16:creationId xmlns:a16="http://schemas.microsoft.com/office/drawing/2014/main" id="{FB350C03-BE20-4899-8E40-CC97478D449D}"/>
+              </a:ext>
+            </a:extLst>
+          </p:cNvPr>
+          <p:cNvCxnSpPr>
+            <a:stCxn id="71" idx="2"/>
+            <a:endCxn id="69" idx="0"/>
+          </p:cNvCxnSpPr>
+          <p:nvPr/>
+        </p:nvCxnSpPr>
+        <p:spPr>
+          <a:xfrm>
+            <a:off x="6323243" y="1515647"/>
+            <a:ext cx="18618" cy="723650"/>
+          </a:xfrm>
+          <a:prstGeom prst="straightConnector1">
+            <a:avLst/>
+          </a:prstGeom>
+          <a:ln>
+            <a:headEnd type="triangle"/>
+            <a:tailEnd type="triangle"/>
+          </a:ln>
+        </p:spPr>
+        <p:style>
+          <a:lnRef idx="1">
+            <a:schemeClr val="accent1"/>
+          </a:lnRef>
+          <a:fillRef idx="0">
+            <a:schemeClr val="accent1"/>
+          </a:fillRef>
+          <a:effectRef idx="0">
+            <a:schemeClr val="accent1"/>
+          </a:effectRef>
+          <a:fontRef idx="minor">
+            <a:schemeClr val="tx1"/>
+          </a:fontRef>
+        </p:style>
+      </p:cxnSp>
+      <p:cxnSp>
+        <p:nvCxnSpPr>
+          <p:cNvPr id="83" name="Conector recto de flecha 82">
+            <a:extLst>
+              <a:ext uri="{FF2B5EF4-FFF2-40B4-BE49-F238E27FC236}">
+                <a16:creationId xmlns:a16="http://schemas.microsoft.com/office/drawing/2014/main" id="{60E6C3F8-8492-4AB5-AF05-75F457071250}"/>
+              </a:ext>
+            </a:extLst>
+          </p:cNvPr>
+          <p:cNvCxnSpPr>
+            <a:cxnSpLocks/>
+          </p:cNvCxnSpPr>
+          <p:nvPr/>
+        </p:nvCxnSpPr>
+        <p:spPr>
+          <a:xfrm flipH="1" flipV="1">
+            <a:off x="9926903" y="2858127"/>
+            <a:ext cx="6225" cy="3142082"/>
+          </a:xfrm>
+          <a:prstGeom prst="straightConnector1">
+            <a:avLst/>
+          </a:prstGeom>
+          <a:ln>
+            <a:headEnd type="triangle"/>
+            <a:tailEnd type="triangle"/>
+          </a:ln>
+        </p:spPr>
+        <p:style>
+          <a:lnRef idx="1">
+            <a:schemeClr val="accent1"/>
+          </a:lnRef>
+          <a:fillRef idx="0">
+            <a:schemeClr val="accent1"/>
+          </a:fillRef>
+          <a:effectRef idx="0">
+            <a:schemeClr val="accent1"/>
+          </a:effectRef>
+          <a:fontRef idx="minor">
+            <a:schemeClr val="tx1"/>
+          </a:fontRef>
+        </p:style>
+      </p:cxnSp>
+      <p:cxnSp>
+        <p:nvCxnSpPr>
+          <p:cNvPr id="87" name="Conector recto de flecha 86">
+            <a:extLst>
+              <a:ext uri="{FF2B5EF4-FFF2-40B4-BE49-F238E27FC236}">
+                <a16:creationId xmlns:a16="http://schemas.microsoft.com/office/drawing/2014/main" id="{262BAFDD-0118-42D5-B409-13047333A265}"/>
+              </a:ext>
+            </a:extLst>
+          </p:cNvPr>
+          <p:cNvCxnSpPr>
+            <a:cxnSpLocks/>
+          </p:cNvCxnSpPr>
+          <p:nvPr/>
+        </p:nvCxnSpPr>
+        <p:spPr>
+          <a:xfrm>
+            <a:off x="7235562" y="1476776"/>
+            <a:ext cx="2277822" cy="726144"/>
+          </a:xfrm>
+          <a:prstGeom prst="straightConnector1">
+            <a:avLst/>
+          </a:prstGeom>
+          <a:ln>
+            <a:headEnd type="triangle"/>
+            <a:tailEnd type="triangle"/>
+          </a:ln>
+        </p:spPr>
+        <p:style>
+          <a:lnRef idx="1">
+            <a:schemeClr val="accent1"/>
+          </a:lnRef>
+          <a:fillRef idx="0">
+            <a:schemeClr val="accent1"/>
+          </a:fillRef>
+          <a:effectRef idx="0">
+            <a:schemeClr val="accent1"/>
+          </a:effectRef>
+          <a:fontRef idx="minor">
+            <a:schemeClr val="tx1"/>
+          </a:fontRef>
+        </p:style>
+      </p:cxnSp>
+      <p:cxnSp>
+        <p:nvCxnSpPr>
+          <p:cNvPr id="90" name="Conector recto de flecha 89">
+            <a:extLst>
+              <a:ext uri="{FF2B5EF4-FFF2-40B4-BE49-F238E27FC236}">
+                <a16:creationId xmlns:a16="http://schemas.microsoft.com/office/drawing/2014/main" id="{9D0A5FCF-9B59-4411-9B0A-81740958B6BA}"/>
+              </a:ext>
+            </a:extLst>
+          </p:cNvPr>
+          <p:cNvCxnSpPr>
+            <a:cxnSpLocks/>
+            <a:stCxn id="34" idx="3"/>
+            <a:endCxn id="71" idx="1"/>
+          </p:cNvCxnSpPr>
+          <p:nvPr/>
+        </p:nvCxnSpPr>
+        <p:spPr>
+          <a:xfrm flipV="1">
+            <a:off x="2378825" y="1174608"/>
+            <a:ext cx="3050329" cy="1112059"/>
+          </a:xfrm>
+          <a:prstGeom prst="straightConnector1">
+            <a:avLst/>
+          </a:prstGeom>
+          <a:ln>
+            <a:headEnd type="triangle"/>
+            <a:tailEnd type="triangle"/>
+          </a:ln>
+        </p:spPr>
+        <p:style>
+          <a:lnRef idx="1">
+            <a:schemeClr val="accent1"/>
+          </a:lnRef>
+          <a:fillRef idx="0">
+            <a:schemeClr val="accent1"/>
+          </a:fillRef>
+          <a:effectRef idx="0">
+            <a:schemeClr val="accent1"/>
+          </a:effectRef>
+          <a:fontRef idx="minor">
+            <a:schemeClr val="tx1"/>
+          </a:fontRef>
+        </p:style>
+      </p:cxnSp>
+      <p:cxnSp>
+        <p:nvCxnSpPr>
+          <p:cNvPr id="94" name="Conector recto de flecha 93">
+            <a:extLst>
+              <a:ext uri="{FF2B5EF4-FFF2-40B4-BE49-F238E27FC236}">
+                <a16:creationId xmlns:a16="http://schemas.microsoft.com/office/drawing/2014/main" id="{A73D3660-3D1D-4231-8876-B55D40E18A0C}"/>
+              </a:ext>
+            </a:extLst>
+          </p:cNvPr>
+          <p:cNvCxnSpPr>
+            <a:cxnSpLocks/>
+            <a:stCxn id="32" idx="3"/>
+          </p:cNvCxnSpPr>
+          <p:nvPr/>
+        </p:nvCxnSpPr>
+        <p:spPr>
+          <a:xfrm flipV="1">
+            <a:off x="2378825" y="1409765"/>
+            <a:ext cx="3041305" cy="2053264"/>
+          </a:xfrm>
+          <a:prstGeom prst="straightConnector1">
+            <a:avLst/>
+          </a:prstGeom>
+          <a:ln>
+            <a:headEnd type="triangle"/>
+            <a:tailEnd type="triangle"/>
+          </a:ln>
+        </p:spPr>
+        <p:style>
+          <a:lnRef idx="1">
+            <a:schemeClr val="accent1"/>
+          </a:lnRef>
+          <a:fillRef idx="0">
+            <a:schemeClr val="accent1"/>
+          </a:fillRef>
+          <a:effectRef idx="0">
+            <a:schemeClr val="accent1"/>
+          </a:effectRef>
+          <a:fontRef idx="minor">
+            <a:schemeClr val="tx1"/>
+          </a:fontRef>
+        </p:style>
+      </p:cxnSp>
     </p:spTree>
     <p:extLst>
       <p:ext uri="{BB962C8B-B14F-4D97-AF65-F5344CB8AC3E}">

</xml_diff>